<commit_message>
Updated template and finished systems diagram draft
</commit_message>
<xml_diff>
--- a/concept_eval/diagrams/diagram_template.pptx
+++ b/concept_eval/diagrams/diagram_template.pptx
@@ -3006,13 +3006,18 @@
           <a:p>
             <a:pPr algn="ctr"/>
             <a:r>
-              <a:rPr lang="en-US" sz="1200" dirty="0">
+              <a:rPr lang="en-US" sz="1200" dirty="0" smtClean="0">
                 <a:solidFill>
                   <a:srgbClr val="000000"/>
                 </a:solidFill>
               </a:rPr>
-              <a:t>TEXT</a:t>
-            </a:r>
+              <a:t>Subsystem</a:t>
+            </a:r>
+            <a:endParaRPr lang="en-US" sz="1200" dirty="0">
+              <a:solidFill>
+                <a:srgbClr val="000000"/>
+              </a:solidFill>
+            </a:endParaRPr>
           </a:p>
         </p:txBody>
       </p:sp>
@@ -3058,13 +3063,18 @@
           <a:p>
             <a:pPr algn="ctr"/>
             <a:r>
-              <a:rPr lang="en-US" sz="1200" dirty="0">
+              <a:rPr lang="en-US" sz="1200" dirty="0" smtClean="0">
                 <a:solidFill>
                   <a:srgbClr val="000000"/>
                 </a:solidFill>
               </a:rPr>
-              <a:t>TEXT</a:t>
-            </a:r>
+              <a:t>Actor</a:t>
+            </a:r>
+            <a:endParaRPr lang="en-US" sz="1200" dirty="0">
+              <a:solidFill>
+                <a:srgbClr val="000000"/>
+              </a:solidFill>
+            </a:endParaRPr>
           </a:p>
         </p:txBody>
       </p:sp>
@@ -3173,6 +3183,188 @@
             <a:schemeClr val="accent1"/>
           </a:fillRef>
           <a:effectRef idx="1">
+            <a:schemeClr val="accent1"/>
+          </a:effectRef>
+          <a:fontRef idx="minor">
+            <a:schemeClr val="tx1"/>
+          </a:fontRef>
+        </p:style>
+      </p:cxnSp>
+      <p:sp>
+        <p:nvSpPr>
+          <p:cNvPr id="2" name="TextBox 1"/>
+          <p:cNvSpPr txBox="1"/>
+          <p:nvPr/>
+        </p:nvSpPr>
+        <p:spPr>
+          <a:xfrm>
+            <a:off x="3868190" y="2133600"/>
+            <a:ext cx="3560911" cy="276999"/>
+          </a:xfrm>
+          <a:prstGeom prst="rect">
+            <a:avLst/>
+          </a:prstGeom>
+          <a:noFill/>
+        </p:spPr>
+        <p:txBody>
+          <a:bodyPr wrap="none" rtlCol="0">
+            <a:spAutoFit/>
+          </a:bodyPr>
+          <a:lstStyle/>
+          <a:p>
+            <a:r>
+              <a:rPr lang="en-US" sz="1200" dirty="0" smtClean="0"/>
+              <a:t>Text box for labeling sections (onboard, </a:t>
+            </a:r>
+            <a:r>
+              <a:rPr lang="en-US" sz="1200" dirty="0" err="1" smtClean="0"/>
+              <a:t>offboard</a:t>
+            </a:r>
+            <a:r>
+              <a:rPr lang="en-US" sz="1200" dirty="0" smtClean="0"/>
+              <a:t>, etc.)</a:t>
+            </a:r>
+            <a:endParaRPr lang="en-US" sz="1200" dirty="0"/>
+          </a:p>
+        </p:txBody>
+      </p:sp>
+      <p:cxnSp>
+        <p:nvCxnSpPr>
+          <p:cNvPr id="12" name="Straight Connector 11"/>
+          <p:cNvCxnSpPr/>
+          <p:nvPr/>
+        </p:nvCxnSpPr>
+        <p:spPr>
+          <a:xfrm>
+            <a:off x="5918200" y="1654810"/>
+            <a:ext cx="1510901" cy="0"/>
+          </a:xfrm>
+          <a:prstGeom prst="line">
+            <a:avLst/>
+          </a:prstGeom>
+          <a:ln w="25400">
+            <a:solidFill>
+              <a:schemeClr val="tx1"/>
+            </a:solidFill>
+          </a:ln>
+          <a:effectLst/>
+        </p:spPr>
+        <p:style>
+          <a:lnRef idx="1">
+            <a:schemeClr val="accent1"/>
+          </a:lnRef>
+          <a:fillRef idx="0">
+            <a:schemeClr val="accent1"/>
+          </a:fillRef>
+          <a:effectRef idx="0">
+            <a:schemeClr val="accent1"/>
+          </a:effectRef>
+          <a:fontRef idx="minor">
+            <a:schemeClr val="tx1"/>
+          </a:fontRef>
+        </p:style>
+      </p:cxnSp>
+      <p:cxnSp>
+        <p:nvCxnSpPr>
+          <p:cNvPr id="14" name="Elbow Connector 13"/>
+          <p:cNvCxnSpPr/>
+          <p:nvPr/>
+        </p:nvCxnSpPr>
+        <p:spPr>
+          <a:xfrm rot="16200000" flipH="1">
+            <a:off x="8101574" y="495153"/>
+            <a:ext cx="1240790" cy="1078523"/>
+          </a:xfrm>
+          <a:prstGeom prst="bentConnector3">
+            <a:avLst/>
+          </a:prstGeom>
+          <a:ln w="25400">
+            <a:solidFill>
+              <a:schemeClr val="tx1"/>
+            </a:solidFill>
+            <a:headEnd type="arrow"/>
+            <a:tailEnd type="arrow"/>
+          </a:ln>
+        </p:spPr>
+        <p:style>
+          <a:lnRef idx="1">
+            <a:schemeClr val="accent1"/>
+          </a:lnRef>
+          <a:fillRef idx="0">
+            <a:schemeClr val="accent1"/>
+          </a:fillRef>
+          <a:effectRef idx="0">
+            <a:schemeClr val="accent1"/>
+          </a:effectRef>
+          <a:fontRef idx="minor">
+            <a:schemeClr val="tx1"/>
+          </a:fontRef>
+        </p:style>
+      </p:cxnSp>
+      <p:cxnSp>
+        <p:nvCxnSpPr>
+          <p:cNvPr id="16" name="Elbow Connector 15"/>
+          <p:cNvCxnSpPr/>
+          <p:nvPr/>
+        </p:nvCxnSpPr>
+        <p:spPr>
+          <a:xfrm rot="16200000" flipH="1">
+            <a:off x="8344291" y="1695450"/>
+            <a:ext cx="957580" cy="876300"/>
+          </a:xfrm>
+          <a:prstGeom prst="bentConnector3">
+            <a:avLst/>
+          </a:prstGeom>
+          <a:ln w="25400">
+            <a:solidFill>
+              <a:schemeClr val="tx1"/>
+            </a:solidFill>
+            <a:tailEnd type="arrow"/>
+          </a:ln>
+        </p:spPr>
+        <p:style>
+          <a:lnRef idx="1">
+            <a:schemeClr val="accent1"/>
+          </a:lnRef>
+          <a:fillRef idx="0">
+            <a:schemeClr val="accent1"/>
+          </a:fillRef>
+          <a:effectRef idx="0">
+            <a:schemeClr val="accent1"/>
+          </a:effectRef>
+          <a:fontRef idx="minor">
+            <a:schemeClr val="tx1"/>
+          </a:fontRef>
+        </p:style>
+      </p:cxnSp>
+      <p:cxnSp>
+        <p:nvCxnSpPr>
+          <p:cNvPr id="18" name="Elbow Connector 17"/>
+          <p:cNvCxnSpPr/>
+          <p:nvPr/>
+        </p:nvCxnSpPr>
+        <p:spPr>
+          <a:xfrm>
+            <a:off x="7946781" y="3091181"/>
+            <a:ext cx="1314450" cy="762000"/>
+          </a:xfrm>
+          <a:prstGeom prst="bentConnector3">
+            <a:avLst/>
+          </a:prstGeom>
+          <a:ln w="25400">
+            <a:solidFill>
+              <a:schemeClr val="tx1"/>
+            </a:solidFill>
+          </a:ln>
+        </p:spPr>
+        <p:style>
+          <a:lnRef idx="1">
+            <a:schemeClr val="accent1"/>
+          </a:lnRef>
+          <a:fillRef idx="0">
+            <a:schemeClr val="accent1"/>
+          </a:fillRef>
+          <a:effectRef idx="0">
             <a:schemeClr val="accent1"/>
           </a:effectRef>
           <a:fontRef idx="minor">

</xml_diff>

<commit_message>
Fixed image processing image
</commit_message>
<xml_diff>
--- a/concept_eval/diagrams/diagram_template.pptx
+++ b/concept_eval/diagrams/diagram_template.pptx
@@ -104,6 +104,11 @@
       </a:defRPr>
     </a:lvl9pPr>
   </p:defaultTextStyle>
+  <p:extLst>
+    <p:ext uri="{EFAFB233-063F-42B5-8137-9DF3F51BA10A}">
+      <p15:sldGuideLst xmlns:p15="http://schemas.microsoft.com/office/powerpoint/2012/main"/>
+    </p:ext>
+  </p:extLst>
 </p:presentation>
 </file>
 
@@ -238,7 +243,7 @@
           <a:p>
             <a:fld id="{D6B90724-950E-48A4-8B46-0BFE040E311C}" type="datetimeFigureOut">
               <a:rPr lang="en-US" smtClean="0"/>
-              <a:t>10/24/2016</a:t>
+              <a:t>10/26/2016</a:t>
             </a:fld>
             <a:endParaRPr lang="en-US"/>
           </a:p>
@@ -408,7 +413,7 @@
           <a:p>
             <a:fld id="{D6B90724-950E-48A4-8B46-0BFE040E311C}" type="datetimeFigureOut">
               <a:rPr lang="en-US" smtClean="0"/>
-              <a:t>10/24/2016</a:t>
+              <a:t>10/26/2016</a:t>
             </a:fld>
             <a:endParaRPr lang="en-US"/>
           </a:p>
@@ -588,7 +593,7 @@
           <a:p>
             <a:fld id="{D6B90724-950E-48A4-8B46-0BFE040E311C}" type="datetimeFigureOut">
               <a:rPr lang="en-US" smtClean="0"/>
-              <a:t>10/24/2016</a:t>
+              <a:t>10/26/2016</a:t>
             </a:fld>
             <a:endParaRPr lang="en-US"/>
           </a:p>
@@ -758,7 +763,7 @@
           <a:p>
             <a:fld id="{D6B90724-950E-48A4-8B46-0BFE040E311C}" type="datetimeFigureOut">
               <a:rPr lang="en-US" smtClean="0"/>
-              <a:t>10/24/2016</a:t>
+              <a:t>10/26/2016</a:t>
             </a:fld>
             <a:endParaRPr lang="en-US"/>
           </a:p>
@@ -1004,7 +1009,7 @@
           <a:p>
             <a:fld id="{D6B90724-950E-48A4-8B46-0BFE040E311C}" type="datetimeFigureOut">
               <a:rPr lang="en-US" smtClean="0"/>
-              <a:t>10/24/2016</a:t>
+              <a:t>10/26/2016</a:t>
             </a:fld>
             <a:endParaRPr lang="en-US"/>
           </a:p>
@@ -1236,7 +1241,7 @@
           <a:p>
             <a:fld id="{D6B90724-950E-48A4-8B46-0BFE040E311C}" type="datetimeFigureOut">
               <a:rPr lang="en-US" smtClean="0"/>
-              <a:t>10/24/2016</a:t>
+              <a:t>10/26/2016</a:t>
             </a:fld>
             <a:endParaRPr lang="en-US"/>
           </a:p>
@@ -1603,7 +1608,7 @@
           <a:p>
             <a:fld id="{D6B90724-950E-48A4-8B46-0BFE040E311C}" type="datetimeFigureOut">
               <a:rPr lang="en-US" smtClean="0"/>
-              <a:t>10/24/2016</a:t>
+              <a:t>10/26/2016</a:t>
             </a:fld>
             <a:endParaRPr lang="en-US"/>
           </a:p>
@@ -1721,7 +1726,7 @@
           <a:p>
             <a:fld id="{D6B90724-950E-48A4-8B46-0BFE040E311C}" type="datetimeFigureOut">
               <a:rPr lang="en-US" smtClean="0"/>
-              <a:t>10/24/2016</a:t>
+              <a:t>10/26/2016</a:t>
             </a:fld>
             <a:endParaRPr lang="en-US"/>
           </a:p>
@@ -1816,7 +1821,7 @@
           <a:p>
             <a:fld id="{D6B90724-950E-48A4-8B46-0BFE040E311C}" type="datetimeFigureOut">
               <a:rPr lang="en-US" smtClean="0"/>
-              <a:t>10/24/2016</a:t>
+              <a:t>10/26/2016</a:t>
             </a:fld>
             <a:endParaRPr lang="en-US"/>
           </a:p>
@@ -2093,7 +2098,7 @@
           <a:p>
             <a:fld id="{D6B90724-950E-48A4-8B46-0BFE040E311C}" type="datetimeFigureOut">
               <a:rPr lang="en-US" smtClean="0"/>
-              <a:t>10/24/2016</a:t>
+              <a:t>10/26/2016</a:t>
             </a:fld>
             <a:endParaRPr lang="en-US"/>
           </a:p>
@@ -2346,7 +2351,7 @@
           <a:p>
             <a:fld id="{D6B90724-950E-48A4-8B46-0BFE040E311C}" type="datetimeFigureOut">
               <a:rPr lang="en-US" smtClean="0"/>
-              <a:t>10/24/2016</a:t>
+              <a:t>10/26/2016</a:t>
             </a:fld>
             <a:endParaRPr lang="en-US"/>
           </a:p>
@@ -2559,7 +2564,7 @@
           <a:p>
             <a:fld id="{D6B90724-950E-48A4-8B46-0BFE040E311C}" type="datetimeFigureOut">
               <a:rPr lang="en-US" smtClean="0"/>
-              <a:t>10/24/2016</a:t>
+              <a:t>10/26/2016</a:t>
             </a:fld>
             <a:endParaRPr lang="en-US"/>
           </a:p>
@@ -3092,7 +3097,7 @@
           <a:prstGeom prst="straightConnector1">
             <a:avLst/>
           </a:prstGeom>
-          <a:ln>
+          <a:ln w="25400">
             <a:solidFill>
               <a:schemeClr val="tx1"/>
             </a:solidFill>
@@ -3129,7 +3134,7 @@
           <a:prstGeom prst="straightConnector1">
             <a:avLst/>
           </a:prstGeom>
-          <a:ln>
+          <a:ln w="25400">
             <a:solidFill>
               <a:schemeClr val="tx1"/>
             </a:solidFill>
@@ -3167,7 +3172,7 @@
           <a:prstGeom prst="line">
             <a:avLst/>
           </a:prstGeom>
-          <a:ln>
+          <a:ln w="25400">
             <a:solidFill>
               <a:schemeClr val="tx1"/>
             </a:solidFill>
@@ -3372,6 +3377,122 @@
           </a:fontRef>
         </p:style>
       </p:cxnSp>
+      <p:sp>
+        <p:nvSpPr>
+          <p:cNvPr id="3" name="Diamond 2"/>
+          <p:cNvSpPr/>
+          <p:nvPr/>
+        </p:nvSpPr>
+        <p:spPr>
+          <a:xfrm>
+            <a:off x="1889760" y="3091180"/>
+            <a:ext cx="1448526" cy="1176019"/>
+          </a:xfrm>
+          <a:prstGeom prst="diamond">
+            <a:avLst/>
+          </a:prstGeom>
+          <a:noFill/>
+          <a:ln>
+            <a:solidFill>
+              <a:schemeClr val="tx1"/>
+            </a:solidFill>
+          </a:ln>
+        </p:spPr>
+        <p:style>
+          <a:lnRef idx="2">
+            <a:schemeClr val="accent1">
+              <a:shade val="50000"/>
+            </a:schemeClr>
+          </a:lnRef>
+          <a:fillRef idx="1">
+            <a:schemeClr val="accent1"/>
+          </a:fillRef>
+          <a:effectRef idx="0">
+            <a:schemeClr val="accent1"/>
+          </a:effectRef>
+          <a:fontRef idx="minor">
+            <a:schemeClr val="lt1"/>
+          </a:fontRef>
+        </p:style>
+        <p:txBody>
+          <a:bodyPr rtlCol="0" anchor="ctr"/>
+          <a:lstStyle/>
+          <a:p>
+            <a:pPr algn="ctr"/>
+            <a:r>
+              <a:rPr lang="en-US" sz="1200" dirty="0" smtClean="0">
+                <a:solidFill>
+                  <a:schemeClr val="tx1"/>
+                </a:solidFill>
+              </a:rPr>
+              <a:t>Flow chart decision</a:t>
+            </a:r>
+            <a:endParaRPr lang="en-US" sz="1200" dirty="0">
+              <a:solidFill>
+                <a:schemeClr val="tx1"/>
+              </a:solidFill>
+            </a:endParaRPr>
+          </a:p>
+        </p:txBody>
+      </p:sp>
+      <p:sp>
+        <p:nvSpPr>
+          <p:cNvPr id="7" name="Oval 6"/>
+          <p:cNvSpPr/>
+          <p:nvPr/>
+        </p:nvSpPr>
+        <p:spPr>
+          <a:xfrm>
+            <a:off x="3976914" y="3628571"/>
+            <a:ext cx="711200" cy="493486"/>
+          </a:xfrm>
+          <a:prstGeom prst="ellipse">
+            <a:avLst/>
+          </a:prstGeom>
+          <a:noFill/>
+          <a:ln>
+            <a:solidFill>
+              <a:schemeClr val="tx1"/>
+            </a:solidFill>
+          </a:ln>
+        </p:spPr>
+        <p:style>
+          <a:lnRef idx="2">
+            <a:schemeClr val="accent1">
+              <a:shade val="50000"/>
+            </a:schemeClr>
+          </a:lnRef>
+          <a:fillRef idx="1">
+            <a:schemeClr val="accent1"/>
+          </a:fillRef>
+          <a:effectRef idx="0">
+            <a:schemeClr val="accent1"/>
+          </a:effectRef>
+          <a:fontRef idx="minor">
+            <a:schemeClr val="lt1"/>
+          </a:fontRef>
+        </p:style>
+        <p:txBody>
+          <a:bodyPr rtlCol="0" anchor="ctr"/>
+          <a:lstStyle/>
+          <a:p>
+            <a:pPr algn="ctr"/>
+            <a:r>
+              <a:rPr lang="en-US" sz="1200" dirty="0" smtClean="0">
+                <a:solidFill>
+                  <a:schemeClr val="tx1"/>
+                </a:solidFill>
+              </a:rPr>
+              <a:t>Yes/No</a:t>
+            </a:r>
+            <a:endParaRPr lang="en-US" sz="1200" dirty="0">
+              <a:solidFill>
+                <a:schemeClr val="tx1"/>
+              </a:solidFill>
+            </a:endParaRPr>
+          </a:p>
+        </p:txBody>
+      </p:sp>
     </p:spTree>
     <p:extLst>
       <p:ext uri="{BB962C8B-B14F-4D97-AF65-F5344CB8AC3E}">

</xml_diff>